<commit_message>
add more text line spacing options
</commit_message>
<xml_diff>
--- a/test-data/slideshow/large-para-test-case.pptx
+++ b/test-data/slideshow/large-para-test-case.pptx
@@ -104,6 +104,11 @@
       </a:defRPr>
     </a:lvl9pPr>
   </p:defaultTextStyle>
+  <p:extLst>
+    <p:ext uri="{EFAFB233-063F-42B5-8137-9DF3F51BA10A}">
+      <p15:sldGuideLst xmlns:p15="http://schemas.microsoft.com/office/powerpoint/2012/main"/>
+    </p:ext>
+  </p:extLst>
 </p:presentation>
 </file>
 
@@ -256,7 +261,7 @@
           <a:p>
             <a:fld id="{0BB78109-7E02-3C4F-BB57-7A3C41FD5863}" type="datetimeFigureOut">
               <a:rPr lang="en-US" smtClean="0"/>
-              <a:t>12/29/22</a:t>
+              <a:t>12/31/22</a:t>
             </a:fld>
             <a:endParaRPr lang="en-US"/>
           </a:p>
@@ -456,7 +461,7 @@
           <a:p>
             <a:fld id="{0BB78109-7E02-3C4F-BB57-7A3C41FD5863}" type="datetimeFigureOut">
               <a:rPr lang="en-US" smtClean="0"/>
-              <a:t>12/29/22</a:t>
+              <a:t>12/31/22</a:t>
             </a:fld>
             <a:endParaRPr lang="en-US"/>
           </a:p>
@@ -666,7 +671,7 @@
           <a:p>
             <a:fld id="{0BB78109-7E02-3C4F-BB57-7A3C41FD5863}" type="datetimeFigureOut">
               <a:rPr lang="en-US" smtClean="0"/>
-              <a:t>12/29/22</a:t>
+              <a:t>12/31/22</a:t>
             </a:fld>
             <a:endParaRPr lang="en-US"/>
           </a:p>
@@ -866,7 +871,7 @@
           <a:p>
             <a:fld id="{0BB78109-7E02-3C4F-BB57-7A3C41FD5863}" type="datetimeFigureOut">
               <a:rPr lang="en-US" smtClean="0"/>
-              <a:t>12/29/22</a:t>
+              <a:t>12/31/22</a:t>
             </a:fld>
             <a:endParaRPr lang="en-US"/>
           </a:p>
@@ -1142,7 +1147,7 @@
           <a:p>
             <a:fld id="{0BB78109-7E02-3C4F-BB57-7A3C41FD5863}" type="datetimeFigureOut">
               <a:rPr lang="en-US" smtClean="0"/>
-              <a:t>12/29/22</a:t>
+              <a:t>12/31/22</a:t>
             </a:fld>
             <a:endParaRPr lang="en-US"/>
           </a:p>
@@ -1410,7 +1415,7 @@
           <a:p>
             <a:fld id="{0BB78109-7E02-3C4F-BB57-7A3C41FD5863}" type="datetimeFigureOut">
               <a:rPr lang="en-US" smtClean="0"/>
-              <a:t>12/29/22</a:t>
+              <a:t>12/31/22</a:t>
             </a:fld>
             <a:endParaRPr lang="en-US"/>
           </a:p>
@@ -1825,7 +1830,7 @@
           <a:p>
             <a:fld id="{0BB78109-7E02-3C4F-BB57-7A3C41FD5863}" type="datetimeFigureOut">
               <a:rPr lang="en-US" smtClean="0"/>
-              <a:t>12/29/22</a:t>
+              <a:t>12/31/22</a:t>
             </a:fld>
             <a:endParaRPr lang="en-US"/>
           </a:p>
@@ -1967,7 +1972,7 @@
           <a:p>
             <a:fld id="{0BB78109-7E02-3C4F-BB57-7A3C41FD5863}" type="datetimeFigureOut">
               <a:rPr lang="en-US" smtClean="0"/>
-              <a:t>12/29/22</a:t>
+              <a:t>12/31/22</a:t>
             </a:fld>
             <a:endParaRPr lang="en-US"/>
           </a:p>
@@ -2080,7 +2085,7 @@
           <a:p>
             <a:fld id="{0BB78109-7E02-3C4F-BB57-7A3C41FD5863}" type="datetimeFigureOut">
               <a:rPr lang="en-US" smtClean="0"/>
-              <a:t>12/29/22</a:t>
+              <a:t>12/31/22</a:t>
             </a:fld>
             <a:endParaRPr lang="en-US"/>
           </a:p>
@@ -2393,7 +2398,7 @@
           <a:p>
             <a:fld id="{0BB78109-7E02-3C4F-BB57-7A3C41FD5863}" type="datetimeFigureOut">
               <a:rPr lang="en-US" smtClean="0"/>
-              <a:t>12/29/22</a:t>
+              <a:t>12/31/22</a:t>
             </a:fld>
             <a:endParaRPr lang="en-US"/>
           </a:p>
@@ -2682,7 +2687,7 @@
           <a:p>
             <a:fld id="{0BB78109-7E02-3C4F-BB57-7A3C41FD5863}" type="datetimeFigureOut">
               <a:rPr lang="en-US" smtClean="0"/>
-              <a:t>12/29/22</a:t>
+              <a:t>12/31/22</a:t>
             </a:fld>
             <a:endParaRPr lang="en-US"/>
           </a:p>
@@ -2925,7 +2930,7 @@
           <a:p>
             <a:fld id="{0BB78109-7E02-3C4F-BB57-7A3C41FD5863}" type="datetimeFigureOut">
               <a:rPr lang="en-US" smtClean="0"/>
-              <a:t>12/29/22</a:t>
+              <a:t>12/31/22</a:t>
             </a:fld>
             <a:endParaRPr lang="en-US"/>
           </a:p>
@@ -3356,7 +3361,7 @@
         </p:nvSpPr>
         <p:spPr>
           <a:xfrm>
-            <a:off x="562708" y="539262"/>
+            <a:off x="539262" y="539262"/>
             <a:ext cx="3915507" cy="2585323"/>
           </a:xfrm>
           <a:prstGeom prst="rect">
@@ -3380,7 +3385,7 @@
                 <a:latin typeface="Arial" panose="020B0604020202020204" pitchFamily="34" charset="0"/>
                 <a:cs typeface="Arial" panose="020B0604020202020204" pitchFamily="34" charset="0"/>
               </a:rPr>
-              <a:t>This is a text box with a large number of lines. It is really pointless text but is used to show that over time the line spacing diverges and is different.</a:t>
+              <a:t>This is a text box with a large number of lines. It is really pointless text but is used to show that over time the line spacing diverges and is different. [Default settings]</a:t>
             </a:r>
           </a:p>
           <a:p>
@@ -3390,6 +3395,150 @@
                 <a:cs typeface="Arial" panose="020B0604020202020204" pitchFamily="34" charset="0"/>
               </a:rPr>
               <a:t>This is an issue that needs to be fixed and will be fixed. There is also some pointless wording put in here to make the text even longer.</a:t>
+            </a:r>
+          </a:p>
+        </p:txBody>
+      </p:sp>
+      <p:sp>
+        <p:nvSpPr>
+          <p:cNvPr id="3" name="TextBox 2">
+            <a:extLst>
+              <a:ext uri="{FF2B5EF4-FFF2-40B4-BE49-F238E27FC236}">
+                <a16:creationId xmlns:a16="http://schemas.microsoft.com/office/drawing/2014/main" id="{1604681A-91E4-8498-2A05-D7B7A74D9A20}"/>
+              </a:ext>
+            </a:extLst>
+          </p:cNvPr>
+          <p:cNvSpPr txBox="1"/>
+          <p:nvPr/>
+        </p:nvSpPr>
+        <p:spPr>
+          <a:xfrm>
+            <a:off x="4783016" y="539262"/>
+            <a:ext cx="3915507" cy="2776401"/>
+          </a:xfrm>
+          <a:prstGeom prst="rect">
+            <a:avLst/>
+          </a:prstGeom>
+          <a:noFill/>
+          <a:ln w="12700">
+            <a:solidFill>
+              <a:srgbClr val="FF0000"/>
+            </a:solidFill>
+          </a:ln>
+        </p:spPr>
+        <p:txBody>
+          <a:bodyPr wrap="square" rtlCol="0">
+            <a:spAutoFit/>
+          </a:bodyPr>
+          <a:lstStyle/>
+          <a:p>
+            <a:pPr>
+              <a:lnSpc>
+                <a:spcPct val="200000"/>
+              </a:lnSpc>
+            </a:pPr>
+            <a:r>
+              <a:rPr lang="en-US" dirty="0">
+                <a:latin typeface="Arial" panose="020B0604020202020204" pitchFamily="34" charset="0"/>
+                <a:cs typeface="Arial" panose="020B0604020202020204" pitchFamily="34" charset="0"/>
+              </a:rPr>
+              <a:t>This is a text box with a large number of lines. It is really pointless text but is used to show that over time the line spacing diverges and is different [double spacing.</a:t>
+            </a:r>
+          </a:p>
+        </p:txBody>
+      </p:sp>
+      <p:sp>
+        <p:nvSpPr>
+          <p:cNvPr id="4" name="TextBox 3">
+            <a:extLst>
+              <a:ext uri="{FF2B5EF4-FFF2-40B4-BE49-F238E27FC236}">
+                <a16:creationId xmlns:a16="http://schemas.microsoft.com/office/drawing/2014/main" id="{0652B68A-7768-936A-62FC-5CD43904FC8B}"/>
+              </a:ext>
+            </a:extLst>
+          </p:cNvPr>
+          <p:cNvSpPr txBox="1"/>
+          <p:nvPr/>
+        </p:nvSpPr>
+        <p:spPr>
+          <a:xfrm>
+            <a:off x="539261" y="3733416"/>
+            <a:ext cx="3915507" cy="1789592"/>
+          </a:xfrm>
+          <a:prstGeom prst="rect">
+            <a:avLst/>
+          </a:prstGeom>
+          <a:noFill/>
+          <a:ln w="12700">
+            <a:solidFill>
+              <a:srgbClr val="FF0000"/>
+            </a:solidFill>
+          </a:ln>
+        </p:spPr>
+        <p:txBody>
+          <a:bodyPr wrap="square" rtlCol="0">
+            <a:spAutoFit/>
+          </a:bodyPr>
+          <a:lstStyle/>
+          <a:p>
+            <a:pPr>
+              <a:lnSpc>
+                <a:spcPts val="2660"/>
+              </a:lnSpc>
+            </a:pPr>
+            <a:r>
+              <a:rPr lang="en-US" dirty="0">
+                <a:latin typeface="Arial" panose="020B0604020202020204" pitchFamily="34" charset="0"/>
+                <a:cs typeface="Arial" panose="020B0604020202020204" pitchFamily="34" charset="0"/>
+              </a:rPr>
+              <a:t>This is a text box with a large number of lines. It is really pointless text but is used to show that over time the line spacing diverges and is different. [exactly 26.6pt settings]</a:t>
+            </a:r>
+          </a:p>
+        </p:txBody>
+      </p:sp>
+      <p:sp>
+        <p:nvSpPr>
+          <p:cNvPr id="5" name="TextBox 4">
+            <a:extLst>
+              <a:ext uri="{FF2B5EF4-FFF2-40B4-BE49-F238E27FC236}">
+                <a16:creationId xmlns:a16="http://schemas.microsoft.com/office/drawing/2014/main" id="{5DA2F12F-8A07-3CE1-6CFE-834F067AD12B}"/>
+              </a:ext>
+            </a:extLst>
+          </p:cNvPr>
+          <p:cNvSpPr txBox="1"/>
+          <p:nvPr/>
+        </p:nvSpPr>
+        <p:spPr>
+          <a:xfrm>
+            <a:off x="4783015" y="3733415"/>
+            <a:ext cx="3915507" cy="1713600"/>
+          </a:xfrm>
+          <a:prstGeom prst="rect">
+            <a:avLst/>
+          </a:prstGeom>
+          <a:noFill/>
+          <a:ln w="12700">
+            <a:solidFill>
+              <a:srgbClr val="FF0000"/>
+            </a:solidFill>
+          </a:ln>
+        </p:spPr>
+        <p:txBody>
+          <a:bodyPr wrap="square" lIns="180000" tIns="180000" rIns="180000" bIns="180000" rtlCol="0">
+            <a:spAutoFit/>
+          </a:bodyPr>
+          <a:lstStyle/>
+          <a:p>
+            <a:pPr>
+              <a:lnSpc>
+                <a:spcPts val="2660"/>
+              </a:lnSpc>
+            </a:pPr>
+            <a:r>
+              <a:rPr lang="en-US" dirty="0">
+                <a:latin typeface="Arial" panose="020B0604020202020204" pitchFamily="34" charset="0"/>
+                <a:cs typeface="Arial" panose="020B0604020202020204" pitchFamily="34" charset="0"/>
+              </a:rPr>
+              <a:t>This is a text box with a large number of lines. It is really pointless text but is used for testing</a:t>
             </a:r>
           </a:p>
         </p:txBody>

</xml_diff>